<commit_message>
added for ppt implemenation
</commit_message>
<xml_diff>
--- a/src/data/test3.pptx
+++ b/src/data/test3.pptx
@@ -104,6 +104,22 @@
       </a:defRPr>
     </a:lvl9pPr>
   </p:defaultTextStyle>
+  <p:extLst>
+    <p:ext uri="{EFAFB233-063F-42B5-8137-9DF3F51BA10A}">
+      <p15:sldGuideLst xmlns:p15="http://schemas.microsoft.com/office/powerpoint/2012/main">
+        <p15:guide id="1" orient="horz" pos="2160">
+          <p15:clr>
+            <a:srgbClr val="A4A3A4"/>
+          </p15:clr>
+        </p15:guide>
+        <p15:guide id="2" pos="2880">
+          <p15:clr>
+            <a:srgbClr val="A4A3A4"/>
+          </p15:clr>
+        </p15:guide>
+      </p15:sldGuideLst>
+    </p:ext>
+  </p:extLst>
 </p:presentation>
 </file>
 
@@ -877,10 +893,9 @@
         <a:p>
           <a:pPr rtl="0"/>
           <a:r>
-            <a:rPr lang="en-US" sz="1600" b="1" dirty="0" smtClean="0"/>
+            <a:rPr lang="en-US" sz="1600" b="1" dirty="0"/>
             <a:t>Something to start with</a:t>
           </a:r>
-          <a:endParaRPr lang="en-US" sz="1600" b="1" dirty="0"/>
         </a:p>
       </dgm:t>
     </dgm:pt>
@@ -915,18 +930,13 @@
         <a:p>
           <a:pPr rtl="0"/>
           <a:r>
-            <a:rPr lang="en-US" sz="1600" b="1" dirty="0" smtClean="0">
+            <a:rPr lang="en-US" sz="1600" b="1" dirty="0">
               <a:solidFill>
                 <a:schemeClr val="bg1"/>
               </a:solidFill>
             </a:rPr>
             <a:t>Add features and fix more bugs</a:t>
           </a:r>
-          <a:endParaRPr lang="en-US" sz="1600" b="1" dirty="0">
-            <a:solidFill>
-              <a:schemeClr val="bg1"/>
-            </a:solidFill>
-          </a:endParaRPr>
         </a:p>
       </dgm:t>
     </dgm:pt>
@@ -961,15 +971,15 @@
         <a:p>
           <a:pPr rtl="0"/>
           <a:r>
-            <a:rPr lang="en-US" sz="1600" b="1" dirty="0" smtClean="0"/>
+            <a:rPr lang="en-US" sz="1600" b="1" dirty="0"/>
             <a:t>All this to get </a:t>
           </a:r>
           <a:r>
-            <a:rPr lang="en-US" sz="1600" b="1" dirty="0" err="1" smtClean="0"/>
+            <a:rPr lang="en-US" sz="1600" b="1" dirty="0" err="1"/>
             <a:t>LibreOffice</a:t>
           </a:r>
           <a:r>
-            <a:rPr lang="en-US" sz="1600" b="1" dirty="0" smtClean="0"/>
+            <a:rPr lang="en-US" sz="1600" b="1" dirty="0"/>
             <a:t> 3.5!</a:t>
           </a:r>
           <a:endParaRPr lang="en-US" sz="1600" b="1" dirty="0">
@@ -1011,7 +1021,7 @@
         <a:p>
           <a:pPr rtl="0"/>
           <a:r>
-            <a:rPr lang="en-US" sz="1600" b="1" dirty="0" smtClean="0"/>
+            <a:rPr lang="en-US" sz="1600" b="1" dirty="0"/>
             <a:t>Cleanup</a:t>
           </a:r>
           <a:endParaRPr lang="en-US" sz="1600" dirty="0"/>
@@ -1049,7 +1059,7 @@
         <a:p>
           <a:pPr rtl="0"/>
           <a:r>
-            <a:rPr lang="en-US" sz="1600" b="1" dirty="0" smtClean="0"/>
+            <a:rPr lang="en-US" sz="1600" b="1" dirty="0"/>
             <a:t>Fix bugs</a:t>
           </a:r>
           <a:endParaRPr lang="en-US" sz="1600" dirty="0"/>
@@ -1086,13 +1096,6 @@
         </dgm:presLayoutVars>
       </dgm:prSet>
       <dgm:spPr/>
-      <dgm:t>
-        <a:bodyPr/>
-        <a:lstStyle/>
-        <a:p>
-          <a:endParaRPr lang="en-US"/>
-        </a:p>
-      </dgm:t>
     </dgm:pt>
     <dgm:pt modelId="{DE618055-EF10-4152-95E6-49B7A13A1478}" type="pres">
       <dgm:prSet presAssocID="{DC93D200-E920-4350-83B2-DC4FD2E23281}" presName="arrow" presStyleLbl="bgShp" presStyleIdx="0" presStyleCnt="1" custLinFactNeighborY="2273"/>
@@ -1109,13 +1112,6 @@
         </dgm:presLayoutVars>
       </dgm:prSet>
       <dgm:spPr/>
-      <dgm:t>
-        <a:bodyPr/>
-        <a:lstStyle/>
-        <a:p>
-          <a:endParaRPr lang="en-US"/>
-        </a:p>
-      </dgm:t>
     </dgm:pt>
     <dgm:pt modelId="{3C855B05-0B57-42CD-BCEF-E796D88ECF65}" type="pres">
       <dgm:prSet presAssocID="{443EB150-C49E-4B58-9ADD-0BD920DA05B2}" presName="sibTrans" presStyleCnt="0"/>
@@ -1128,13 +1124,6 @@
         </dgm:presLayoutVars>
       </dgm:prSet>
       <dgm:spPr/>
-      <dgm:t>
-        <a:bodyPr/>
-        <a:lstStyle/>
-        <a:p>
-          <a:endParaRPr lang="en-US"/>
-        </a:p>
-      </dgm:t>
     </dgm:pt>
     <dgm:pt modelId="{AA8C0863-6B82-4033-963A-D6E6BA7C462D}" type="pres">
       <dgm:prSet presAssocID="{B29DEFB7-693F-4033-B226-D0D7FAAED0B2}" presName="sibTrans" presStyleCnt="0"/>
@@ -1147,13 +1136,6 @@
         </dgm:presLayoutVars>
       </dgm:prSet>
       <dgm:spPr/>
-      <dgm:t>
-        <a:bodyPr/>
-        <a:lstStyle/>
-        <a:p>
-          <a:endParaRPr lang="en-US"/>
-        </a:p>
-      </dgm:t>
     </dgm:pt>
     <dgm:pt modelId="{4DD357B5-4361-4500-83FF-DA7D9247645D}" type="pres">
       <dgm:prSet presAssocID="{A20453E4-CBB5-4E5C-B049-3E7806FFDCFB}" presName="sibTrans" presStyleCnt="0"/>
@@ -1166,13 +1148,6 @@
         </dgm:presLayoutVars>
       </dgm:prSet>
       <dgm:spPr/>
-      <dgm:t>
-        <a:bodyPr/>
-        <a:lstStyle/>
-        <a:p>
-          <a:endParaRPr lang="en-US"/>
-        </a:p>
-      </dgm:t>
     </dgm:pt>
     <dgm:pt modelId="{F7A9FBA7-7210-4CC4-BC81-47B0E2E4700D}" type="pres">
       <dgm:prSet presAssocID="{6733EC59-BB20-4386-8EFB-4221DEFAB717}" presName="sibTrans" presStyleCnt="0"/>
@@ -1185,27 +1160,20 @@
         </dgm:presLayoutVars>
       </dgm:prSet>
       <dgm:spPr/>
-      <dgm:t>
-        <a:bodyPr/>
-        <a:lstStyle/>
-        <a:p>
-          <a:endParaRPr lang="en-US"/>
-        </a:p>
-      </dgm:t>
     </dgm:pt>
   </dgm:ptLst>
   <dgm:cxnLst>
-    <dgm:cxn modelId="{591814D9-E7CD-410C-93AD-23A2BAD488C2}" srcId="{DC93D200-E920-4350-83B2-DC4FD2E23281}" destId="{3280CB96-103C-4F8E-BF6C-5304E958AD8C}" srcOrd="3" destOrd="0" parTransId="{E883BE40-BC4D-47FD-8D0B-78AF069F057A}" sibTransId="{6733EC59-BB20-4386-8EFB-4221DEFAB717}"/>
-    <dgm:cxn modelId="{84928473-132F-4C6F-8E6A-E0B8A098A659}" srcId="{DC93D200-E920-4350-83B2-DC4FD2E23281}" destId="{4A937DE6-AA4B-4B5A-9ABB-6222B03C668A}" srcOrd="0" destOrd="0" parTransId="{834E7E9E-5C5F-4A89-9A02-5AC835DFA8A0}" sibTransId="{443EB150-C49E-4B58-9ADD-0BD920DA05B2}"/>
-    <dgm:cxn modelId="{BC4653F5-15FD-467A-BA70-027281E35899}" srcId="{DC93D200-E920-4350-83B2-DC4FD2E23281}" destId="{FE4A0A36-0340-4401-A243-3DF81EF122C8}" srcOrd="2" destOrd="0" parTransId="{D8D9C5C3-3D5C-4FA1-A632-DB8F8E1E44D8}" sibTransId="{A20453E4-CBB5-4E5C-B049-3E7806FFDCFB}"/>
-    <dgm:cxn modelId="{AEF7DC79-D37F-4884-B431-EF5264BFBE98}" type="presOf" srcId="{DC93D200-E920-4350-83B2-DC4FD2E23281}" destId="{AE35D762-C640-43EF-87F8-A227B17C46E1}" srcOrd="0" destOrd="0" presId="urn:microsoft.com/office/officeart/2005/8/layout/hProcess9"/>
-    <dgm:cxn modelId="{93FB1145-0A65-4A1A-8D2E-2530D18737D3}" type="presOf" srcId="{39CD45F0-20F0-4314-9AC7-06DA2C48BA70}" destId="{97F2192E-E663-48E3-B1F4-D700D253D9EE}" srcOrd="0" destOrd="0" presId="urn:microsoft.com/office/officeart/2005/8/layout/hProcess9"/>
-    <dgm:cxn modelId="{7D4D4176-2A25-4683-BECA-4D259B02AC51}" type="presOf" srcId="{FE4A0A36-0340-4401-A243-3DF81EF122C8}" destId="{150922E9-A757-4A57-BE5B-44547F0CF16D}" srcOrd="0" destOrd="0" presId="urn:microsoft.com/office/officeart/2005/8/layout/hProcess9"/>
     <dgm:cxn modelId="{248FB924-DEB5-4274-9502-88B974A0D968}" srcId="{DC93D200-E920-4350-83B2-DC4FD2E23281}" destId="{39CD45F0-20F0-4314-9AC7-06DA2C48BA70}" srcOrd="1" destOrd="0" parTransId="{89049F11-A74D-4154-B326-950ACC306FEA}" sibTransId="{B29DEFB7-693F-4033-B226-D0D7FAAED0B2}"/>
     <dgm:cxn modelId="{5D2CA725-0A33-4AFD-8A98-5ADC2255BD82}" srcId="{DC93D200-E920-4350-83B2-DC4FD2E23281}" destId="{CF5FAD27-B4A9-4590-AA7E-F1B8AA5AFAF4}" srcOrd="4" destOrd="0" parTransId="{5B112825-1E98-43A8-91B4-05F458C4B354}" sibTransId="{3842FA35-1C93-42E9-8BB3-8DA780E2B55C}"/>
+    <dgm:cxn modelId="{93FB1145-0A65-4A1A-8D2E-2530D18737D3}" type="presOf" srcId="{39CD45F0-20F0-4314-9AC7-06DA2C48BA70}" destId="{97F2192E-E663-48E3-B1F4-D700D253D9EE}" srcOrd="0" destOrd="0" presId="urn:microsoft.com/office/officeart/2005/8/layout/hProcess9"/>
     <dgm:cxn modelId="{0E7D5551-68AB-4C6D-999F-03C77EB25088}" type="presOf" srcId="{CF5FAD27-B4A9-4590-AA7E-F1B8AA5AFAF4}" destId="{977EAF0B-D938-417D-AA0B-EE912A0C305A}" srcOrd="0" destOrd="0" presId="urn:microsoft.com/office/officeart/2005/8/layout/hProcess9"/>
+    <dgm:cxn modelId="{84928473-132F-4C6F-8E6A-E0B8A098A659}" srcId="{DC93D200-E920-4350-83B2-DC4FD2E23281}" destId="{4A937DE6-AA4B-4B5A-9ABB-6222B03C668A}" srcOrd="0" destOrd="0" parTransId="{834E7E9E-5C5F-4A89-9A02-5AC835DFA8A0}" sibTransId="{443EB150-C49E-4B58-9ADD-0BD920DA05B2}"/>
+    <dgm:cxn modelId="{7D4D4176-2A25-4683-BECA-4D259B02AC51}" type="presOf" srcId="{FE4A0A36-0340-4401-A243-3DF81EF122C8}" destId="{150922E9-A757-4A57-BE5B-44547F0CF16D}" srcOrd="0" destOrd="0" presId="urn:microsoft.com/office/officeart/2005/8/layout/hProcess9"/>
     <dgm:cxn modelId="{CC3BFF77-2332-4DDB-902E-506C29D031C1}" type="presOf" srcId="{3280CB96-103C-4F8E-BF6C-5304E958AD8C}" destId="{646C2C25-358E-44E6-A9F4-6648A3926777}" srcOrd="0" destOrd="0" presId="urn:microsoft.com/office/officeart/2005/8/layout/hProcess9"/>
+    <dgm:cxn modelId="{AEF7DC79-D37F-4884-B431-EF5264BFBE98}" type="presOf" srcId="{DC93D200-E920-4350-83B2-DC4FD2E23281}" destId="{AE35D762-C640-43EF-87F8-A227B17C46E1}" srcOrd="0" destOrd="0" presId="urn:microsoft.com/office/officeart/2005/8/layout/hProcess9"/>
     <dgm:cxn modelId="{052060B9-96AB-4857-AE01-8AB9B02B4DB2}" type="presOf" srcId="{4A937DE6-AA4B-4B5A-9ABB-6222B03C668A}" destId="{95727E2E-12AA-47B6-A79A-C74594B6DA34}" srcOrd="0" destOrd="0" presId="urn:microsoft.com/office/officeart/2005/8/layout/hProcess9"/>
+    <dgm:cxn modelId="{591814D9-E7CD-410C-93AD-23A2BAD488C2}" srcId="{DC93D200-E920-4350-83B2-DC4FD2E23281}" destId="{3280CB96-103C-4F8E-BF6C-5304E958AD8C}" srcOrd="3" destOrd="0" parTransId="{E883BE40-BC4D-47FD-8D0B-78AF069F057A}" sibTransId="{6733EC59-BB20-4386-8EFB-4221DEFAB717}"/>
+    <dgm:cxn modelId="{BC4653F5-15FD-467A-BA70-027281E35899}" srcId="{DC93D200-E920-4350-83B2-DC4FD2E23281}" destId="{FE4A0A36-0340-4401-A243-3DF81EF122C8}" srcOrd="2" destOrd="0" parTransId="{D8D9C5C3-3D5C-4FA1-A632-DB8F8E1E44D8}" sibTransId="{A20453E4-CBB5-4E5C-B049-3E7806FFDCFB}"/>
     <dgm:cxn modelId="{8D32E56D-BD91-47ED-9FBF-62C9C48B018F}" type="presParOf" srcId="{AE35D762-C640-43EF-87F8-A227B17C46E1}" destId="{DE618055-EF10-4152-95E6-49B7A13A1478}" srcOrd="0" destOrd="0" presId="urn:microsoft.com/office/officeart/2005/8/layout/hProcess9"/>
     <dgm:cxn modelId="{FA36262C-62F5-4465-ADDA-A621BC42EF0C}" type="presParOf" srcId="{AE35D762-C640-43EF-87F8-A227B17C46E1}" destId="{5D0D0289-2123-4DB3-B742-780ABBEE29A6}" srcOrd="1" destOrd="0" presId="urn:microsoft.com/office/officeart/2005/8/layout/hProcess9"/>
     <dgm:cxn modelId="{7C37F6D4-B607-494E-BC8B-F4C0D91AA779}" type="presParOf" srcId="{5D0D0289-2123-4DB3-B742-780ABBEE29A6}" destId="{95727E2E-12AA-47B6-A79A-C74594B6DA34}" srcOrd="0" destOrd="0" presId="urn:microsoft.com/office/officeart/2005/8/layout/hProcess9"/>
@@ -1372,7 +1340,7 @@
         </a:bodyPr>
         <a:lstStyle/>
         <a:p>
-          <a:pPr lvl="0" algn="ctr" defTabSz="711200" rtl="0">
+          <a:pPr marL="0" lvl="0" indent="0" algn="ctr" defTabSz="711200" rtl="0">
             <a:lnSpc>
               <a:spcPct val="90000"/>
             </a:lnSpc>
@@ -1382,12 +1350,12 @@
             <a:spcAft>
               <a:spcPct val="35000"/>
             </a:spcAft>
+            <a:buNone/>
           </a:pPr>
           <a:r>
-            <a:rPr lang="en-US" sz="1600" b="1" kern="1200" dirty="0" smtClean="0"/>
+            <a:rPr lang="en-US" sz="1600" b="1" kern="1200" dirty="0"/>
             <a:t>Something to start with</a:t>
           </a:r>
-          <a:endParaRPr lang="en-US" sz="1600" b="1" kern="1200" dirty="0"/>
         </a:p>
       </dsp:txBody>
       <dsp:txXfrm>
@@ -1485,7 +1453,7 @@
         </a:bodyPr>
         <a:lstStyle/>
         <a:p>
-          <a:pPr lvl="0" algn="ctr" defTabSz="711200" rtl="0">
+          <a:pPr marL="0" lvl="0" indent="0" algn="ctr" defTabSz="711200" rtl="0">
             <a:lnSpc>
               <a:spcPct val="90000"/>
             </a:lnSpc>
@@ -1495,9 +1463,10 @@
             <a:spcAft>
               <a:spcPct val="35000"/>
             </a:spcAft>
+            <a:buNone/>
           </a:pPr>
           <a:r>
-            <a:rPr lang="en-US" sz="1600" b="1" kern="1200" dirty="0" smtClean="0"/>
+            <a:rPr lang="en-US" sz="1600" b="1" kern="1200" dirty="0"/>
             <a:t>Cleanup</a:t>
           </a:r>
           <a:endParaRPr lang="en-US" sz="1600" kern="1200" dirty="0"/>
@@ -1598,7 +1567,7 @@
         </a:bodyPr>
         <a:lstStyle/>
         <a:p>
-          <a:pPr lvl="0" algn="ctr" defTabSz="711200" rtl="0">
+          <a:pPr marL="0" lvl="0" indent="0" algn="ctr" defTabSz="711200" rtl="0">
             <a:lnSpc>
               <a:spcPct val="90000"/>
             </a:lnSpc>
@@ -1608,9 +1577,10 @@
             <a:spcAft>
               <a:spcPct val="35000"/>
             </a:spcAft>
+            <a:buNone/>
           </a:pPr>
           <a:r>
-            <a:rPr lang="en-US" sz="1600" b="1" kern="1200" dirty="0" smtClean="0"/>
+            <a:rPr lang="en-US" sz="1600" b="1" kern="1200" dirty="0"/>
             <a:t>Fix bugs</a:t>
           </a:r>
           <a:endParaRPr lang="en-US" sz="1600" kern="1200" dirty="0"/>
@@ -1711,7 +1681,7 @@
         </a:bodyPr>
         <a:lstStyle/>
         <a:p>
-          <a:pPr lvl="0" algn="ctr" defTabSz="711200" rtl="0">
+          <a:pPr marL="0" lvl="0" indent="0" algn="ctr" defTabSz="711200" rtl="0">
             <a:lnSpc>
               <a:spcPct val="90000"/>
             </a:lnSpc>
@@ -1721,20 +1691,16 @@
             <a:spcAft>
               <a:spcPct val="35000"/>
             </a:spcAft>
+            <a:buNone/>
           </a:pPr>
           <a:r>
-            <a:rPr lang="en-US" sz="1600" b="1" kern="1200" dirty="0" smtClean="0">
+            <a:rPr lang="en-US" sz="1600" b="1" kern="1200" dirty="0">
               <a:solidFill>
                 <a:schemeClr val="bg1"/>
               </a:solidFill>
             </a:rPr>
             <a:t>Add features and fix more bugs</a:t>
           </a:r>
-          <a:endParaRPr lang="en-US" sz="1600" b="1" kern="1200" dirty="0">
-            <a:solidFill>
-              <a:schemeClr val="bg1"/>
-            </a:solidFill>
-          </a:endParaRPr>
         </a:p>
       </dsp:txBody>
       <dsp:txXfrm>
@@ -1832,7 +1798,7 @@
         </a:bodyPr>
         <a:lstStyle/>
         <a:p>
-          <a:pPr lvl="0" algn="ctr" defTabSz="711200" rtl="0">
+          <a:pPr marL="0" lvl="0" indent="0" algn="ctr" defTabSz="711200" rtl="0">
             <a:lnSpc>
               <a:spcPct val="90000"/>
             </a:lnSpc>
@@ -1842,17 +1808,18 @@
             <a:spcAft>
               <a:spcPct val="35000"/>
             </a:spcAft>
+            <a:buNone/>
           </a:pPr>
           <a:r>
-            <a:rPr lang="en-US" sz="1600" b="1" kern="1200" dirty="0" smtClean="0"/>
+            <a:rPr lang="en-US" sz="1600" b="1" kern="1200" dirty="0"/>
             <a:t>All this to get </a:t>
           </a:r>
           <a:r>
-            <a:rPr lang="en-US" sz="1600" b="1" kern="1200" dirty="0" err="1" smtClean="0"/>
+            <a:rPr lang="en-US" sz="1600" b="1" kern="1200" dirty="0" err="1"/>
             <a:t>LibreOffice</a:t>
           </a:r>
           <a:r>
-            <a:rPr lang="en-US" sz="1600" b="1" kern="1200" dirty="0" smtClean="0"/>
+            <a:rPr lang="en-US" sz="1600" b="1" kern="1200" dirty="0"/>
             <a:t> 3.5!</a:t>
           </a:r>
           <a:endParaRPr lang="en-US" sz="1600" b="1" kern="1200" dirty="0">
@@ -3097,10 +3064,9 @@
           <a:lstStyle/>
           <a:p>
             <a:r>
-              <a:rPr lang="en-US" smtClean="0"/>
+              <a:rPr lang="en-US"/>
               <a:t>Click to edit Master title style</a:t>
             </a:r>
-            <a:endParaRPr lang="en-US"/>
           </a:p>
         </p:txBody>
       </p:sp>
@@ -3216,10 +3182,9 @@
           </a:lstStyle>
           <a:p>
             <a:r>
-              <a:rPr lang="en-US" smtClean="0"/>
+              <a:rPr lang="en-US"/>
               <a:t>Click to edit Master subtitle style</a:t>
             </a:r>
-            <a:endParaRPr lang="en-US"/>
           </a:p>
         </p:txBody>
       </p:sp>
@@ -3240,7 +3205,7 @@
           <a:p>
             <a:fld id="{F98968A8-D55D-40A8-96AB-AE1B2060DAB7}" type="datetimeFigureOut">
               <a:rPr lang="en-US" smtClean="0"/>
-              <a:t>12/30/2011</a:t>
+              <a:t>2/4/2026</a:t>
             </a:fld>
             <a:endParaRPr lang="en-US"/>
           </a:p>
@@ -3334,10 +3299,9 @@
           <a:lstStyle/>
           <a:p>
             <a:r>
-              <a:rPr lang="en-US" smtClean="0"/>
+              <a:rPr lang="en-US"/>
               <a:t>Click to edit Master title style</a:t>
             </a:r>
-            <a:endParaRPr lang="en-US"/>
           </a:p>
         </p:txBody>
       </p:sp>
@@ -3358,38 +3322,37 @@
           <a:p>
             <a:pPr lvl="0"/>
             <a:r>
-              <a:rPr lang="en-US" smtClean="0"/>
+              <a:rPr lang="en-US"/>
               <a:t>Click to edit Master text styles</a:t>
             </a:r>
           </a:p>
           <a:p>
             <a:pPr lvl="1"/>
             <a:r>
-              <a:rPr lang="en-US" smtClean="0"/>
+              <a:rPr lang="en-US"/>
               <a:t>Second level</a:t>
             </a:r>
           </a:p>
           <a:p>
             <a:pPr lvl="2"/>
             <a:r>
-              <a:rPr lang="en-US" smtClean="0"/>
+              <a:rPr lang="en-US"/>
               <a:t>Third level</a:t>
             </a:r>
           </a:p>
           <a:p>
             <a:pPr lvl="3"/>
             <a:r>
-              <a:rPr lang="en-US" smtClean="0"/>
+              <a:rPr lang="en-US"/>
               <a:t>Fourth level</a:t>
             </a:r>
           </a:p>
           <a:p>
             <a:pPr lvl="4"/>
             <a:r>
-              <a:rPr lang="en-US" smtClean="0"/>
+              <a:rPr lang="en-US"/>
               <a:t>Fifth level</a:t>
             </a:r>
-            <a:endParaRPr lang="en-US"/>
           </a:p>
         </p:txBody>
       </p:sp>
@@ -3410,7 +3373,7 @@
           <a:p>
             <a:fld id="{F98968A8-D55D-40A8-96AB-AE1B2060DAB7}" type="datetimeFigureOut">
               <a:rPr lang="en-US" smtClean="0"/>
-              <a:t>12/30/2011</a:t>
+              <a:t>2/4/2026</a:t>
             </a:fld>
             <a:endParaRPr lang="en-US"/>
           </a:p>
@@ -3509,10 +3472,9 @@
           <a:lstStyle/>
           <a:p>
             <a:r>
-              <a:rPr lang="en-US" smtClean="0"/>
+              <a:rPr lang="en-US"/>
               <a:t>Click to edit Master title style</a:t>
             </a:r>
-            <a:endParaRPr lang="en-US"/>
           </a:p>
         </p:txBody>
       </p:sp>
@@ -3538,38 +3500,37 @@
           <a:p>
             <a:pPr lvl="0"/>
             <a:r>
-              <a:rPr lang="en-US" smtClean="0"/>
+              <a:rPr lang="en-US"/>
               <a:t>Click to edit Master text styles</a:t>
             </a:r>
           </a:p>
           <a:p>
             <a:pPr lvl="1"/>
             <a:r>
-              <a:rPr lang="en-US" smtClean="0"/>
+              <a:rPr lang="en-US"/>
               <a:t>Second level</a:t>
             </a:r>
           </a:p>
           <a:p>
             <a:pPr lvl="2"/>
             <a:r>
-              <a:rPr lang="en-US" smtClean="0"/>
+              <a:rPr lang="en-US"/>
               <a:t>Third level</a:t>
             </a:r>
           </a:p>
           <a:p>
             <a:pPr lvl="3"/>
             <a:r>
-              <a:rPr lang="en-US" smtClean="0"/>
+              <a:rPr lang="en-US"/>
               <a:t>Fourth level</a:t>
             </a:r>
           </a:p>
           <a:p>
             <a:pPr lvl="4"/>
             <a:r>
-              <a:rPr lang="en-US" smtClean="0"/>
+              <a:rPr lang="en-US"/>
               <a:t>Fifth level</a:t>
             </a:r>
-            <a:endParaRPr lang="en-US"/>
           </a:p>
         </p:txBody>
       </p:sp>
@@ -3590,7 +3551,7 @@
           <a:p>
             <a:fld id="{F98968A8-D55D-40A8-96AB-AE1B2060DAB7}" type="datetimeFigureOut">
               <a:rPr lang="en-US" smtClean="0"/>
-              <a:t>12/30/2011</a:t>
+              <a:t>2/4/2026</a:t>
             </a:fld>
             <a:endParaRPr lang="en-US"/>
           </a:p>
@@ -3684,10 +3645,9 @@
           <a:lstStyle/>
           <a:p>
             <a:r>
-              <a:rPr lang="en-US" smtClean="0"/>
+              <a:rPr lang="en-US"/>
               <a:t>Click to edit Master title style</a:t>
             </a:r>
-            <a:endParaRPr lang="en-US"/>
           </a:p>
         </p:txBody>
       </p:sp>
@@ -3708,38 +3668,37 @@
           <a:p>
             <a:pPr lvl="0"/>
             <a:r>
-              <a:rPr lang="en-US" smtClean="0"/>
+              <a:rPr lang="en-US"/>
               <a:t>Click to edit Master text styles</a:t>
             </a:r>
           </a:p>
           <a:p>
             <a:pPr lvl="1"/>
             <a:r>
-              <a:rPr lang="en-US" smtClean="0"/>
+              <a:rPr lang="en-US"/>
               <a:t>Second level</a:t>
             </a:r>
           </a:p>
           <a:p>
             <a:pPr lvl="2"/>
             <a:r>
-              <a:rPr lang="en-US" smtClean="0"/>
+              <a:rPr lang="en-US"/>
               <a:t>Third level</a:t>
             </a:r>
           </a:p>
           <a:p>
             <a:pPr lvl="3"/>
             <a:r>
-              <a:rPr lang="en-US" smtClean="0"/>
+              <a:rPr lang="en-US"/>
               <a:t>Fourth level</a:t>
             </a:r>
           </a:p>
           <a:p>
             <a:pPr lvl="4"/>
             <a:r>
-              <a:rPr lang="en-US" smtClean="0"/>
+              <a:rPr lang="en-US"/>
               <a:t>Fifth level</a:t>
             </a:r>
-            <a:endParaRPr lang="en-US"/>
           </a:p>
         </p:txBody>
       </p:sp>
@@ -3760,7 +3719,7 @@
           <a:p>
             <a:fld id="{F98968A8-D55D-40A8-96AB-AE1B2060DAB7}" type="datetimeFigureOut">
               <a:rPr lang="en-US" smtClean="0"/>
-              <a:t>12/30/2011</a:t>
+              <a:t>2/4/2026</a:t>
             </a:fld>
             <a:endParaRPr lang="en-US"/>
           </a:p>
@@ -3863,10 +3822,9 @@
           </a:lstStyle>
           <a:p>
             <a:r>
-              <a:rPr lang="en-US" smtClean="0"/>
+              <a:rPr lang="en-US"/>
               <a:t>Click to edit Master title style</a:t>
             </a:r>
-            <a:endParaRPr lang="en-US"/>
           </a:p>
         </p:txBody>
       </p:sp>
@@ -3983,7 +3941,7 @@
           <a:p>
             <a:pPr lvl="0"/>
             <a:r>
-              <a:rPr lang="en-US" smtClean="0"/>
+              <a:rPr lang="en-US"/>
               <a:t>Click to edit Master text styles</a:t>
             </a:r>
           </a:p>
@@ -4006,7 +3964,7 @@
           <a:p>
             <a:fld id="{F98968A8-D55D-40A8-96AB-AE1B2060DAB7}" type="datetimeFigureOut">
               <a:rPr lang="en-US" smtClean="0"/>
-              <a:t>12/30/2011</a:t>
+              <a:t>2/4/2026</a:t>
             </a:fld>
             <a:endParaRPr lang="en-US"/>
           </a:p>
@@ -4100,10 +4058,9 @@
           <a:lstStyle/>
           <a:p>
             <a:r>
-              <a:rPr lang="en-US" smtClean="0"/>
+              <a:rPr lang="en-US"/>
               <a:t>Click to edit Master title style</a:t>
             </a:r>
-            <a:endParaRPr lang="en-US"/>
           </a:p>
         </p:txBody>
       </p:sp>
@@ -4157,38 +4114,37 @@
           <a:p>
             <a:pPr lvl="0"/>
             <a:r>
-              <a:rPr lang="en-US" smtClean="0"/>
+              <a:rPr lang="en-US"/>
               <a:t>Click to edit Master text styles</a:t>
             </a:r>
           </a:p>
           <a:p>
             <a:pPr lvl="1"/>
             <a:r>
-              <a:rPr lang="en-US" smtClean="0"/>
+              <a:rPr lang="en-US"/>
               <a:t>Second level</a:t>
             </a:r>
           </a:p>
           <a:p>
             <a:pPr lvl="2"/>
             <a:r>
-              <a:rPr lang="en-US" smtClean="0"/>
+              <a:rPr lang="en-US"/>
               <a:t>Third level</a:t>
             </a:r>
           </a:p>
           <a:p>
             <a:pPr lvl="3"/>
             <a:r>
-              <a:rPr lang="en-US" smtClean="0"/>
+              <a:rPr lang="en-US"/>
               <a:t>Fourth level</a:t>
             </a:r>
           </a:p>
           <a:p>
             <a:pPr lvl="4"/>
             <a:r>
-              <a:rPr lang="en-US" smtClean="0"/>
+              <a:rPr lang="en-US"/>
               <a:t>Fifth level</a:t>
             </a:r>
-            <a:endParaRPr lang="en-US"/>
           </a:p>
         </p:txBody>
       </p:sp>
@@ -4242,38 +4198,37 @@
           <a:p>
             <a:pPr lvl="0"/>
             <a:r>
-              <a:rPr lang="en-US" smtClean="0"/>
+              <a:rPr lang="en-US"/>
               <a:t>Click to edit Master text styles</a:t>
             </a:r>
           </a:p>
           <a:p>
             <a:pPr lvl="1"/>
             <a:r>
-              <a:rPr lang="en-US" smtClean="0"/>
+              <a:rPr lang="en-US"/>
               <a:t>Second level</a:t>
             </a:r>
           </a:p>
           <a:p>
             <a:pPr lvl="2"/>
             <a:r>
-              <a:rPr lang="en-US" smtClean="0"/>
+              <a:rPr lang="en-US"/>
               <a:t>Third level</a:t>
             </a:r>
           </a:p>
           <a:p>
             <a:pPr lvl="3"/>
             <a:r>
-              <a:rPr lang="en-US" smtClean="0"/>
+              <a:rPr lang="en-US"/>
               <a:t>Fourth level</a:t>
             </a:r>
           </a:p>
           <a:p>
             <a:pPr lvl="4"/>
             <a:r>
-              <a:rPr lang="en-US" smtClean="0"/>
+              <a:rPr lang="en-US"/>
               <a:t>Fifth level</a:t>
             </a:r>
-            <a:endParaRPr lang="en-US"/>
           </a:p>
         </p:txBody>
       </p:sp>
@@ -4294,7 +4249,7 @@
           <a:p>
             <a:fld id="{F98968A8-D55D-40A8-96AB-AE1B2060DAB7}" type="datetimeFigureOut">
               <a:rPr lang="en-US" smtClean="0"/>
-              <a:t>12/30/2011</a:t>
+              <a:t>2/4/2026</a:t>
             </a:fld>
             <a:endParaRPr lang="en-US"/>
           </a:p>
@@ -4392,10 +4347,9 @@
           </a:lstStyle>
           <a:p>
             <a:r>
-              <a:rPr lang="en-US" smtClean="0"/>
+              <a:rPr lang="en-US"/>
               <a:t>Click to edit Master title style</a:t>
             </a:r>
-            <a:endParaRPr lang="en-US"/>
           </a:p>
         </p:txBody>
       </p:sp>
@@ -4458,7 +4412,7 @@
           <a:p>
             <a:pPr lvl="0"/>
             <a:r>
-              <a:rPr lang="en-US" smtClean="0"/>
+              <a:rPr lang="en-US"/>
               <a:t>Click to edit Master text styles</a:t>
             </a:r>
           </a:p>
@@ -4514,38 +4468,37 @@
           <a:p>
             <a:pPr lvl="0"/>
             <a:r>
-              <a:rPr lang="en-US" smtClean="0"/>
+              <a:rPr lang="en-US"/>
               <a:t>Click to edit Master text styles</a:t>
             </a:r>
           </a:p>
           <a:p>
             <a:pPr lvl="1"/>
             <a:r>
-              <a:rPr lang="en-US" smtClean="0"/>
+              <a:rPr lang="en-US"/>
               <a:t>Second level</a:t>
             </a:r>
           </a:p>
           <a:p>
             <a:pPr lvl="2"/>
             <a:r>
-              <a:rPr lang="en-US" smtClean="0"/>
+              <a:rPr lang="en-US"/>
               <a:t>Third level</a:t>
             </a:r>
           </a:p>
           <a:p>
             <a:pPr lvl="3"/>
             <a:r>
-              <a:rPr lang="en-US" smtClean="0"/>
+              <a:rPr lang="en-US"/>
               <a:t>Fourth level</a:t>
             </a:r>
           </a:p>
           <a:p>
             <a:pPr lvl="4"/>
             <a:r>
-              <a:rPr lang="en-US" smtClean="0"/>
+              <a:rPr lang="en-US"/>
               <a:t>Fifth level</a:t>
             </a:r>
-            <a:endParaRPr lang="en-US"/>
           </a:p>
         </p:txBody>
       </p:sp>
@@ -4608,7 +4561,7 @@
           <a:p>
             <a:pPr lvl="0"/>
             <a:r>
-              <a:rPr lang="en-US" smtClean="0"/>
+              <a:rPr lang="en-US"/>
               <a:t>Click to edit Master text styles</a:t>
             </a:r>
           </a:p>
@@ -4664,38 +4617,37 @@
           <a:p>
             <a:pPr lvl="0"/>
             <a:r>
-              <a:rPr lang="en-US" smtClean="0"/>
+              <a:rPr lang="en-US"/>
               <a:t>Click to edit Master text styles</a:t>
             </a:r>
           </a:p>
           <a:p>
             <a:pPr lvl="1"/>
             <a:r>
-              <a:rPr lang="en-US" smtClean="0"/>
+              <a:rPr lang="en-US"/>
               <a:t>Second level</a:t>
             </a:r>
           </a:p>
           <a:p>
             <a:pPr lvl="2"/>
             <a:r>
-              <a:rPr lang="en-US" smtClean="0"/>
+              <a:rPr lang="en-US"/>
               <a:t>Third level</a:t>
             </a:r>
           </a:p>
           <a:p>
             <a:pPr lvl="3"/>
             <a:r>
-              <a:rPr lang="en-US" smtClean="0"/>
+              <a:rPr lang="en-US"/>
               <a:t>Fourth level</a:t>
             </a:r>
           </a:p>
           <a:p>
             <a:pPr lvl="4"/>
             <a:r>
-              <a:rPr lang="en-US" smtClean="0"/>
+              <a:rPr lang="en-US"/>
               <a:t>Fifth level</a:t>
             </a:r>
-            <a:endParaRPr lang="en-US"/>
           </a:p>
         </p:txBody>
       </p:sp>
@@ -4716,7 +4668,7 @@
           <a:p>
             <a:fld id="{F98968A8-D55D-40A8-96AB-AE1B2060DAB7}" type="datetimeFigureOut">
               <a:rPr lang="en-US" smtClean="0"/>
-              <a:t>12/30/2011</a:t>
+              <a:t>2/4/2026</a:t>
             </a:fld>
             <a:endParaRPr lang="en-US"/>
           </a:p>
@@ -4810,10 +4762,9 @@
           <a:lstStyle/>
           <a:p>
             <a:r>
-              <a:rPr lang="en-US" smtClean="0"/>
+              <a:rPr lang="en-US"/>
               <a:t>Click to edit Master title style</a:t>
             </a:r>
-            <a:endParaRPr lang="en-US"/>
           </a:p>
         </p:txBody>
       </p:sp>
@@ -4834,7 +4785,7 @@
           <a:p>
             <a:fld id="{F98968A8-D55D-40A8-96AB-AE1B2060DAB7}" type="datetimeFigureOut">
               <a:rPr lang="en-US" smtClean="0"/>
-              <a:t>12/30/2011</a:t>
+              <a:t>2/4/2026</a:t>
             </a:fld>
             <a:endParaRPr lang="en-US"/>
           </a:p>
@@ -4929,7 +4880,7 @@
           <a:p>
             <a:fld id="{F98968A8-D55D-40A8-96AB-AE1B2060DAB7}" type="datetimeFigureOut">
               <a:rPr lang="en-US" smtClean="0"/>
-              <a:t>12/30/2011</a:t>
+              <a:t>2/4/2026</a:t>
             </a:fld>
             <a:endParaRPr lang="en-US"/>
           </a:p>
@@ -5032,10 +4983,9 @@
           </a:lstStyle>
           <a:p>
             <a:r>
-              <a:rPr lang="en-US" smtClean="0"/>
+              <a:rPr lang="en-US"/>
               <a:t>Click to edit Master title style</a:t>
             </a:r>
-            <a:endParaRPr lang="en-US"/>
           </a:p>
         </p:txBody>
       </p:sp>
@@ -5089,38 +5039,37 @@
           <a:p>
             <a:pPr lvl="0"/>
             <a:r>
-              <a:rPr lang="en-US" smtClean="0"/>
+              <a:rPr lang="en-US"/>
               <a:t>Click to edit Master text styles</a:t>
             </a:r>
           </a:p>
           <a:p>
             <a:pPr lvl="1"/>
             <a:r>
-              <a:rPr lang="en-US" smtClean="0"/>
+              <a:rPr lang="en-US"/>
               <a:t>Second level</a:t>
             </a:r>
           </a:p>
           <a:p>
             <a:pPr lvl="2"/>
             <a:r>
-              <a:rPr lang="en-US" smtClean="0"/>
+              <a:rPr lang="en-US"/>
               <a:t>Third level</a:t>
             </a:r>
           </a:p>
           <a:p>
             <a:pPr lvl="3"/>
             <a:r>
-              <a:rPr lang="en-US" smtClean="0"/>
+              <a:rPr lang="en-US"/>
               <a:t>Fourth level</a:t>
             </a:r>
           </a:p>
           <a:p>
             <a:pPr lvl="4"/>
             <a:r>
-              <a:rPr lang="en-US" smtClean="0"/>
+              <a:rPr lang="en-US"/>
               <a:t>Fifth level</a:t>
             </a:r>
-            <a:endParaRPr lang="en-US"/>
           </a:p>
         </p:txBody>
       </p:sp>
@@ -5183,7 +5132,7 @@
           <a:p>
             <a:pPr lvl="0"/>
             <a:r>
-              <a:rPr lang="en-US" smtClean="0"/>
+              <a:rPr lang="en-US"/>
               <a:t>Click to edit Master text styles</a:t>
             </a:r>
           </a:p>
@@ -5206,7 +5155,7 @@
           <a:p>
             <a:fld id="{F98968A8-D55D-40A8-96AB-AE1B2060DAB7}" type="datetimeFigureOut">
               <a:rPr lang="en-US" smtClean="0"/>
-              <a:t>12/30/2011</a:t>
+              <a:t>2/4/2026</a:t>
             </a:fld>
             <a:endParaRPr lang="en-US"/>
           </a:p>
@@ -5309,10 +5258,9 @@
           </a:lstStyle>
           <a:p>
             <a:r>
-              <a:rPr lang="en-US" smtClean="0"/>
+              <a:rPr lang="en-US"/>
               <a:t>Click to edit Master title style</a:t>
             </a:r>
-            <a:endParaRPr lang="en-US"/>
           </a:p>
         </p:txBody>
       </p:sp>
@@ -5436,7 +5384,7 @@
           <a:p>
             <a:pPr lvl="0"/>
             <a:r>
-              <a:rPr lang="en-US" smtClean="0"/>
+              <a:rPr lang="en-US"/>
               <a:t>Click to edit Master text styles</a:t>
             </a:r>
           </a:p>
@@ -5459,7 +5407,7 @@
           <a:p>
             <a:fld id="{F98968A8-D55D-40A8-96AB-AE1B2060DAB7}" type="datetimeFigureOut">
               <a:rPr lang="en-US" smtClean="0"/>
-              <a:t>12/30/2011</a:t>
+              <a:t>2/4/2026</a:t>
             </a:fld>
             <a:endParaRPr lang="en-US"/>
           </a:p>
@@ -5568,10 +5516,9 @@
           <a:lstStyle/>
           <a:p>
             <a:r>
-              <a:rPr lang="en-US" smtClean="0"/>
+              <a:rPr lang="en-US"/>
               <a:t>Click to edit Master title style</a:t>
             </a:r>
-            <a:endParaRPr lang="en-US"/>
           </a:p>
         </p:txBody>
       </p:sp>
@@ -5602,38 +5549,37 @@
           <a:p>
             <a:pPr lvl="0"/>
             <a:r>
-              <a:rPr lang="en-US" smtClean="0"/>
+              <a:rPr lang="en-US"/>
               <a:t>Click to edit Master text styles</a:t>
             </a:r>
           </a:p>
           <a:p>
             <a:pPr lvl="1"/>
             <a:r>
-              <a:rPr lang="en-US" smtClean="0"/>
+              <a:rPr lang="en-US"/>
               <a:t>Second level</a:t>
             </a:r>
           </a:p>
           <a:p>
             <a:pPr lvl="2"/>
             <a:r>
-              <a:rPr lang="en-US" smtClean="0"/>
+              <a:rPr lang="en-US"/>
               <a:t>Third level</a:t>
             </a:r>
           </a:p>
           <a:p>
             <a:pPr lvl="3"/>
             <a:r>
-              <a:rPr lang="en-US" smtClean="0"/>
+              <a:rPr lang="en-US"/>
               <a:t>Fourth level</a:t>
             </a:r>
           </a:p>
           <a:p>
             <a:pPr lvl="4"/>
             <a:r>
-              <a:rPr lang="en-US" smtClean="0"/>
+              <a:rPr lang="en-US"/>
               <a:t>Fifth level</a:t>
             </a:r>
-            <a:endParaRPr lang="en-US"/>
           </a:p>
         </p:txBody>
       </p:sp>
@@ -5672,7 +5618,7 @@
           <a:p>
             <a:fld id="{F98968A8-D55D-40A8-96AB-AE1B2060DAB7}" type="datetimeFigureOut">
               <a:rPr lang="en-US" smtClean="0"/>
-              <a:t>12/30/2011</a:t>
+              <a:t>2/4/2026</a:t>
             </a:fld>
             <a:endParaRPr lang="en-US"/>
           </a:p>
@@ -6130,7 +6076,7 @@
               </a:tabLst>
             </a:pPr>
             <a:r>
-              <a:rPr lang="en-US" sz="3200" b="1" dirty="0" smtClean="0">
+              <a:rPr lang="en-US" sz="3200" b="1" dirty="0">
                 <a:solidFill>
                   <a:srgbClr val="455560"/>
                 </a:solidFill>
@@ -6138,28 +6084,12 @@
               <a:t>Sample Slide containing </a:t>
             </a:r>
             <a:r>
-              <a:rPr lang="en-US" sz="3200" b="1" dirty="0">
+              <a:rPr lang="en-US" sz="3200" b="1">
                 <a:solidFill>
                   <a:srgbClr val="455560"/>
                 </a:solidFill>
               </a:rPr>
-              <a:t>S</a:t>
-            </a:r>
-            <a:r>
-              <a:rPr lang="en-US" sz="3200" b="1" dirty="0" smtClean="0">
-                <a:solidFill>
-                  <a:srgbClr val="455560"/>
-                </a:solidFill>
-              </a:rPr>
-              <a:t>martArt in </a:t>
-            </a:r>
-            <a:r>
-              <a:rPr lang="en-US" sz="3200" b="1" dirty="0" err="1" smtClean="0">
-                <a:solidFill>
-                  <a:srgbClr val="455560"/>
-                </a:solidFill>
-              </a:rPr>
-              <a:t>extLst</a:t>
+              <a:t>Smart Art</a:t>
             </a:r>
             <a:endParaRPr lang="en-US" sz="3200" b="1" dirty="0">
               <a:solidFill>
@@ -6240,19 +6170,10 @@
                 </a:solidFill>
                 <a:cs typeface="Arial" charset="0"/>
               </a:rPr>
-              <a:t>This is a test </a:t>
+              <a:t>This is a test document with d</a:t>
             </a:r>
             <a:r>
-              <a:rPr lang="en-US" b="1" dirty="0" smtClean="0">
-                <a:solidFill>
-                  <a:srgbClr val="455560"/>
-                </a:solidFill>
-                <a:cs typeface="Arial" charset="0"/>
-              </a:rPr>
-              <a:t>document with d</a:t>
-            </a:r>
-            <a:r>
-              <a:rPr lang="en-US" sz="1800" b="1" dirty="0" smtClean="0">
+              <a:rPr lang="en-US" sz="1800" b="1" dirty="0">
                 <a:solidFill>
                   <a:srgbClr val="455560"/>
                 </a:solidFill>
@@ -6297,7 +6218,7 @@
                 <a:tab pos="9309100" algn="l"/>
               </a:tabLst>
             </a:pPr>
-            <a:endParaRPr lang="en-US" sz="1800" dirty="0" smtClean="0"/>
+            <a:endParaRPr lang="en-US" sz="1800" dirty="0"/>
           </a:p>
           <a:p>
             <a:pPr marL="165100" indent="-165100">
@@ -6335,7 +6256,7 @@
                 <a:tab pos="9309100" algn="l"/>
               </a:tabLst>
             </a:pPr>
-            <a:endParaRPr lang="en-GB" sz="1800" dirty="0" smtClean="0">
+            <a:endParaRPr lang="en-GB" sz="1800" dirty="0">
               <a:solidFill>
                 <a:srgbClr val="455560"/>
               </a:solidFill>

</xml_diff>